<commit_message>
Put the good NLL
</commit_message>
<xml_diff>
--- a/Poster/poster_ift_6269_project.pptx
+++ b/Poster/poster_ift_6269_project.pptx
@@ -114,7 +114,7 @@
   </p:defaultTextStyle>
   <p:extLst>
     <p:ext uri="{EFAFB233-063F-42B5-8137-9DF3F51BA10A}">
-      <p15:sldGuideLst xmlns:p15="http://schemas.microsoft.com/office/powerpoint/2012/main" xmlns="">
+      <p15:sldGuideLst xmlns:p15="http://schemas.microsoft.com/office/powerpoint/2012/main">
         <p15:guide id="1" orient="horz" pos="3318">
           <p15:clr>
             <a:srgbClr val="A4A3A4"/>
@@ -168,7 +168,7 @@
       </p15:sldGuideLst>
     </p:ext>
     <p:ext uri="{2D200454-40CA-4A62-9FC3-DE9A4176ACB9}">
-      <p15:notesGuideLst xmlns:p15="http://schemas.microsoft.com/office/powerpoint/2012/main" xmlns="">
+      <p15:notesGuideLst xmlns:p15="http://schemas.microsoft.com/office/powerpoint/2012/main">
         <p15:guide id="1" orient="horz" pos="2880">
           <p15:clr>
             <a:srgbClr val="A4A3A4"/>
@@ -277,7 +277,7 @@
             <a:fld id="{0158C5BC-9A70-462C-B28D-9600239EAC64}" type="datetimeFigureOut">
               <a:rPr lang="en-US" smtClean="0"/>
               <a:pPr/>
-              <a:t>2018-12-06</a:t>
+              <a:t>12/10/2018</a:t>
             </a:fld>
             <a:endParaRPr lang="en-US"/>
           </a:p>
@@ -444,7 +444,7 @@
             <a:fld id="{E6CC2317-6751-4CD4-9995-8782DD78E936}" type="datetimeFigureOut">
               <a:rPr lang="en-US" smtClean="0"/>
               <a:pPr/>
-              <a:t>2018-12-06</a:t>
+              <a:t>12/10/2018</a:t>
             </a:fld>
             <a:endParaRPr lang="en-US" dirty="0"/>
           </a:p>
@@ -4500,15 +4500,6 @@
                 </a:rPr>
                 <a:t>PosterPresentations.com</a:t>
               </a:r>
-              <a:r>
-                <a:rPr lang="en-US" sz="2800" dirty="0">
-                  <a:solidFill>
-                    <a:schemeClr val="bg1"/>
-                  </a:solidFill>
-                  <a:latin typeface="Trebuchet MS" pitchFamily="34" charset="0"/>
-                </a:rPr>
-                <a:t/>
-              </a:r>
               <a:br>
                 <a:rPr lang="en-US" sz="2800" dirty="0">
                   <a:solidFill>
@@ -4744,15 +4735,6 @@
             </a:p>
             <a:p>
               <a:pPr algn="l"/>
-              <a:r>
-                <a:rPr lang="en-US" sz="2800" b="1" baseline="0" dirty="0">
-                  <a:solidFill>
-                    <a:schemeClr val="bg1"/>
-                  </a:solidFill>
-                  <a:latin typeface="Trebuchet MS" pitchFamily="34" charset="0"/>
-                </a:rPr>
-                <a:t/>
-              </a:r>
               <a:br>
                 <a:rPr lang="en-US" sz="2800" b="1" baseline="0" dirty="0">
                   <a:solidFill>
@@ -5361,7 +5343,7 @@
               <a:graphicData uri="http://schemas.openxmlformats.org/presentationml/2006/ole">
                 <mc:AlternateContent xmlns:mc="http://schemas.openxmlformats.org/markup-compatibility/2006">
                   <mc:Choice xmlns:v="urn:schemas-microsoft-com:vml" Requires="v">
-                    <p:oleObj spid="_x0000_s1133" name="Image" r:id="rId8" imgW="1828440" imgH="1117440" progId="Photoshop.Image.13">
+                    <p:oleObj spid="_x0000_s1141" name="Image" r:id="rId8" imgW="1828440" imgH="1117440" progId="Photoshop.Image.13">
                       <p:embed/>
                     </p:oleObj>
                   </mc:Choice>
@@ -5418,7 +5400,7 @@
               <a:graphicData uri="http://schemas.openxmlformats.org/presentationml/2006/ole">
                 <mc:AlternateContent xmlns:mc="http://schemas.openxmlformats.org/markup-compatibility/2006">
                   <mc:Choice xmlns:v="urn:schemas-microsoft-com:vml" Requires="v">
-                    <p:oleObj spid="_x0000_s1134" name="Image" r:id="rId10" imgW="1828440" imgH="1117440" progId="Photoshop.Image.13">
+                    <p:oleObj spid="_x0000_s1142" name="Image" r:id="rId10" imgW="1828440" imgH="1117440" progId="Photoshop.Image.13">
                       <p:embed/>
                     </p:oleObj>
                   </mc:Choice>
@@ -6541,7 +6523,7 @@
             <a:graphicData uri="http://schemas.openxmlformats.org/presentationml/2006/ole">
               <mc:AlternateContent xmlns:mc="http://schemas.openxmlformats.org/markup-compatibility/2006">
                 <mc:Choice xmlns:v="urn:schemas-microsoft-com:vml" Requires="v">
-                  <p:oleObj spid="_x0000_s1135" name="Image" r:id="rId12" imgW="4571280" imgH="1688760" progId="Photoshop.Image.13">
+                  <p:oleObj spid="_x0000_s1143" name="Image" r:id="rId12" imgW="4571280" imgH="1688760" progId="Photoshop.Image.13">
                     <p:embed/>
                   </p:oleObj>
                 </mc:Choice>
@@ -6625,7 +6607,7 @@
             <a:graphicData uri="http://schemas.openxmlformats.org/presentationml/2006/ole">
               <mc:AlternateContent xmlns:mc="http://schemas.openxmlformats.org/markup-compatibility/2006">
                 <mc:Choice xmlns:v="urn:schemas-microsoft-com:vml" Requires="v">
-                  <p:oleObj spid="_x0000_s1136" name="Image" r:id="rId15" imgW="1574280" imgH="1053720" progId="Photoshop.Image.13">
+                  <p:oleObj spid="_x0000_s1144" name="Image" r:id="rId15" imgW="1574280" imgH="1053720" progId="Photoshop.Image.13">
                     <p:embed/>
                   </p:oleObj>
                 </mc:Choice>
@@ -6961,14 +6943,6 @@
                   </a:solidFill>
                 </a:rPr>
                 <a:t>94710</a:t>
-              </a:r>
-              <a:r>
-                <a:rPr lang="en-US" sz="2400" baseline="0" dirty="0">
-                  <a:solidFill>
-                    <a:schemeClr val="bg1"/>
-                  </a:solidFill>
-                </a:rPr>
-                <a:t/>
               </a:r>
               <a:br>
                 <a:rPr lang="en-US" sz="2400" baseline="0" dirty="0">
@@ -8615,7 +8589,7 @@
             <a:graphicData uri="http://schemas.openxmlformats.org/presentationml/2006/ole">
               <mc:AlternateContent xmlns:mc="http://schemas.openxmlformats.org/markup-compatibility/2006">
                 <mc:Choice xmlns:v="urn:schemas-microsoft-com:vml" Requires="v">
-                  <p:oleObj spid="_x0000_s2157" name="Image" r:id="rId4" imgW="4571280" imgH="1688760" progId="Photoshop.Image.13">
+                  <p:oleObj spid="_x0000_s2165" name="Image" r:id="rId4" imgW="4571280" imgH="1688760" progId="Photoshop.Image.13">
                     <p:embed/>
                   </p:oleObj>
                 </mc:Choice>
@@ -8699,7 +8673,7 @@
             <a:graphicData uri="http://schemas.openxmlformats.org/presentationml/2006/ole">
               <mc:AlternateContent xmlns:mc="http://schemas.openxmlformats.org/markup-compatibility/2006">
                 <mc:Choice xmlns:v="urn:schemas-microsoft-com:vml" Requires="v">
-                  <p:oleObj spid="_x0000_s2158" name="Image" r:id="rId7" imgW="1574280" imgH="1053720" progId="Photoshop.Image.13">
+                  <p:oleObj spid="_x0000_s2166" name="Image" r:id="rId7" imgW="1574280" imgH="1053720" progId="Photoshop.Image.13">
                     <p:embed/>
                   </p:oleObj>
                 </mc:Choice>
@@ -9036,14 +9010,6 @@
                 </a:rPr>
                 <a:t>94710</a:t>
               </a:r>
-              <a:r>
-                <a:rPr lang="en-US" sz="2400" baseline="0" dirty="0">
-                  <a:solidFill>
-                    <a:schemeClr val="bg1"/>
-                  </a:solidFill>
-                </a:rPr>
-                <a:t/>
-              </a:r>
               <a:br>
                 <a:rPr lang="en-US" sz="2400" baseline="0" dirty="0">
                   <a:solidFill>
@@ -9373,15 +9339,6 @@
                 </a:rPr>
                 <a:t>PosterPresentations.com</a:t>
               </a:r>
-              <a:r>
-                <a:rPr lang="en-US" sz="2800" dirty="0">
-                  <a:solidFill>
-                    <a:schemeClr val="bg1"/>
-                  </a:solidFill>
-                  <a:latin typeface="Trebuchet MS" pitchFamily="34" charset="0"/>
-                </a:rPr>
-                <a:t/>
-              </a:r>
               <a:br>
                 <a:rPr lang="en-US" sz="2800" dirty="0">
                   <a:solidFill>
@@ -9617,15 +9574,6 @@
             </a:p>
             <a:p>
               <a:pPr algn="l"/>
-              <a:r>
-                <a:rPr lang="en-US" sz="2800" b="1" baseline="0" dirty="0">
-                  <a:solidFill>
-                    <a:schemeClr val="bg1"/>
-                  </a:solidFill>
-                  <a:latin typeface="Trebuchet MS" pitchFamily="34" charset="0"/>
-                </a:rPr>
-                <a:t/>
-              </a:r>
               <a:br>
                 <a:rPr lang="en-US" sz="2800" b="1" baseline="0" dirty="0">
                   <a:solidFill>
@@ -10234,7 +10182,7 @@
               <a:graphicData uri="http://schemas.openxmlformats.org/presentationml/2006/ole">
                 <mc:AlternateContent xmlns:mc="http://schemas.openxmlformats.org/markup-compatibility/2006">
                   <mc:Choice xmlns:v="urn:schemas-microsoft-com:vml" Requires="v">
-                    <p:oleObj spid="_x0000_s2159" name="Image" r:id="rId15" imgW="1828440" imgH="1117440" progId="Photoshop.Image.13">
+                    <p:oleObj spid="_x0000_s2167" name="Image" r:id="rId15" imgW="1828440" imgH="1117440" progId="Photoshop.Image.13">
                       <p:embed/>
                     </p:oleObj>
                   </mc:Choice>
@@ -10291,7 +10239,7 @@
               <a:graphicData uri="http://schemas.openxmlformats.org/presentationml/2006/ole">
                 <mc:AlternateContent xmlns:mc="http://schemas.openxmlformats.org/markup-compatibility/2006">
                   <mc:Choice xmlns:v="urn:schemas-microsoft-com:vml" Requires="v">
-                    <p:oleObj spid="_x0000_s2160" name="Image" r:id="rId17" imgW="1828440" imgH="1117440" progId="Photoshop.Image.13">
+                    <p:oleObj spid="_x0000_s2168" name="Image" r:id="rId17" imgW="1828440" imgH="1117440" progId="Photoshop.Image.13">
                       <p:embed/>
                     </p:oleObj>
                   </mc:Choice>
@@ -12077,7 +12025,7 @@
             <a:graphicData uri="http://schemas.openxmlformats.org/presentationml/2006/ole">
               <mc:AlternateContent xmlns:mc="http://schemas.openxmlformats.org/markup-compatibility/2006">
                 <mc:Choice xmlns:v="urn:schemas-microsoft-com:vml" Requires="v">
-                  <p:oleObj spid="_x0000_s3181" name="Image" r:id="rId4" imgW="4571280" imgH="1688760" progId="Photoshop.Image.13">
+                  <p:oleObj spid="_x0000_s3189" name="Image" r:id="rId4" imgW="4571280" imgH="1688760" progId="Photoshop.Image.13">
                     <p:embed/>
                   </p:oleObj>
                 </mc:Choice>
@@ -12161,7 +12109,7 @@
             <a:graphicData uri="http://schemas.openxmlformats.org/presentationml/2006/ole">
               <mc:AlternateContent xmlns:mc="http://schemas.openxmlformats.org/markup-compatibility/2006">
                 <mc:Choice xmlns:v="urn:schemas-microsoft-com:vml" Requires="v">
-                  <p:oleObj spid="_x0000_s3182" name="Image" r:id="rId7" imgW="1574280" imgH="1053720" progId="Photoshop.Image.13">
+                  <p:oleObj spid="_x0000_s3190" name="Image" r:id="rId7" imgW="1574280" imgH="1053720" progId="Photoshop.Image.13">
                     <p:embed/>
                   </p:oleObj>
                 </mc:Choice>
@@ -12498,14 +12446,6 @@
                 </a:rPr>
                 <a:t>94710</a:t>
               </a:r>
-              <a:r>
-                <a:rPr lang="en-US" sz="2400" baseline="0" dirty="0">
-                  <a:solidFill>
-                    <a:schemeClr val="bg1"/>
-                  </a:solidFill>
-                </a:rPr>
-                <a:t/>
-              </a:r>
               <a:br>
                 <a:rPr lang="en-US" sz="2400" baseline="0" dirty="0">
                   <a:solidFill>
@@ -12835,15 +12775,6 @@
                 </a:rPr>
                 <a:t>PosterPresentations.com</a:t>
               </a:r>
-              <a:r>
-                <a:rPr lang="en-US" sz="2800" dirty="0">
-                  <a:solidFill>
-                    <a:schemeClr val="bg1"/>
-                  </a:solidFill>
-                  <a:latin typeface="Trebuchet MS" pitchFamily="34" charset="0"/>
-                </a:rPr>
-                <a:t/>
-              </a:r>
               <a:br>
                 <a:rPr lang="en-US" sz="2800" dirty="0">
                   <a:solidFill>
@@ -13079,15 +13010,6 @@
             </a:p>
             <a:p>
               <a:pPr algn="l"/>
-              <a:r>
-                <a:rPr lang="en-US" sz="2800" b="1" baseline="0" dirty="0">
-                  <a:solidFill>
-                    <a:schemeClr val="bg1"/>
-                  </a:solidFill>
-                  <a:latin typeface="Trebuchet MS" pitchFamily="34" charset="0"/>
-                </a:rPr>
-                <a:t/>
-              </a:r>
               <a:br>
                 <a:rPr lang="en-US" sz="2800" b="1" baseline="0" dirty="0">
                   <a:solidFill>
@@ -13696,7 +13618,7 @@
               <a:graphicData uri="http://schemas.openxmlformats.org/presentationml/2006/ole">
                 <mc:AlternateContent xmlns:mc="http://schemas.openxmlformats.org/markup-compatibility/2006">
                   <mc:Choice xmlns:v="urn:schemas-microsoft-com:vml" Requires="v">
-                    <p:oleObj spid="_x0000_s3183" name="Image" r:id="rId15" imgW="1828440" imgH="1117440" progId="Photoshop.Image.13">
+                    <p:oleObj spid="_x0000_s3191" name="Image" r:id="rId15" imgW="1828440" imgH="1117440" progId="Photoshop.Image.13">
                       <p:embed/>
                     </p:oleObj>
                   </mc:Choice>
@@ -13753,7 +13675,7 @@
               <a:graphicData uri="http://schemas.openxmlformats.org/presentationml/2006/ole">
                 <mc:AlternateContent xmlns:mc="http://schemas.openxmlformats.org/markup-compatibility/2006">
                   <mc:Choice xmlns:v="urn:schemas-microsoft-com:vml" Requires="v">
-                    <p:oleObj spid="_x0000_s3184" name="Image" r:id="rId17" imgW="1828440" imgH="1117440" progId="Photoshop.Image.13">
+                    <p:oleObj spid="_x0000_s3192" name="Image" r:id="rId17" imgW="1828440" imgH="1117440" progId="Photoshop.Image.13">
                       <p:embed/>
                     </p:oleObj>
                   </mc:Choice>
@@ -14261,15 +14183,7 @@
           <a:p>
             <a:r>
               <a:rPr lang="en-US" dirty="0"/>
-              <a:t>Generative models aims at learning the true data distribution which allow us to generate new data points. They are useful for multiple task such as image generation, dimensionality reduction</a:t>
-            </a:r>
-            <a:r>
-              <a:rPr lang="en-US" dirty="0" smtClean="0"/>
-              <a:t>. One </a:t>
-            </a:r>
-            <a:r>
-              <a:rPr lang="en-US" dirty="0"/>
-              <a:t>of the most commonly use generative model is the Variational Autoencoder (VAE). The VAE learn a generative model by maximizing a lower bound on the log-likelihood. The VAE is not perfect and have some downside.</a:t>
+              <a:t>Generative models aims at learning the true data distribution which allow us to generate new data points. They are useful for multiple task such as image generation, dimensionality reduction. One of the most commonly use generative model is the Variational Autoencoder (VAE). The VAE learn a generative model by maximizing a lower bound on the log-likelihood. The VAE is not perfect and have some downside.</a:t>
             </a:r>
           </a:p>
           <a:p>
@@ -14518,35 +14432,23 @@
           <a:p>
             <a:r>
               <a:rPr lang="en-US" dirty="0"/>
-              <a:t>Some assumptions are made on the posterior distribution. </a:t>
+              <a:t>Some assumptions are made on the posterior distribution. First, by looking at the second term of the objective  D</a:t>
+            </a:r>
+            <a:r>
+              <a:rPr lang="en-US" baseline="-25000" dirty="0"/>
+              <a:t>KL</a:t>
             </a:r>
             <a:r>
               <a:rPr lang="en-US" dirty="0"/>
-              <a:t>First, by looking at the second term of the </a:t>
-            </a:r>
-            <a:r>
-              <a:rPr lang="en-US" dirty="0" smtClean="0"/>
-              <a:t>objective  D</a:t>
-            </a:r>
-            <a:r>
-              <a:rPr lang="en-US" baseline="-25000" dirty="0" smtClean="0"/>
-              <a:t>KL</a:t>
-            </a:r>
-            <a:r>
-              <a:rPr lang="en-US" dirty="0" smtClean="0"/>
               <a:t>[q(</a:t>
             </a:r>
             <a:r>
-              <a:rPr lang="en-US" dirty="0" err="1" smtClean="0"/>
+              <a:rPr lang="en-US" dirty="0" err="1"/>
               <a:t>z|x</a:t>
             </a:r>
             <a:r>
-              <a:rPr lang="en-US" dirty="0" smtClean="0"/>
-              <a:t>) || p(z)], </a:t>
-            </a:r>
-            <a:r>
               <a:rPr lang="en-US" dirty="0"/>
-              <a:t>we can interpret that term as a </a:t>
+              <a:t>) || p(z)], we can interpret that term as a </a:t>
             </a:r>
             <a:r>
               <a:rPr lang="en-US" dirty="0" err="1"/>
@@ -14556,32 +14458,23 @@
               <a:rPr lang="en-US" dirty="0"/>
               <a:t> that penalizes when the posterior is not close to the standard normal distribution. </a:t>
             </a:r>
-            <a:endParaRPr lang="en-US" dirty="0" smtClean="0"/>
           </a:p>
           <a:p>
             <a:endParaRPr lang="en-US" dirty="0"/>
           </a:p>
           <a:p>
             <a:r>
-              <a:rPr lang="en-US" dirty="0" smtClean="0"/>
-              <a:t>Secondly</a:t>
-            </a:r>
-            <a:r>
               <a:rPr lang="en-US" dirty="0"/>
-              <a:t>, if we look at the first term of the objective </a:t>
-            </a:r>
-            <a:r>
-              <a:rPr lang="en-US" dirty="0" smtClean="0"/>
-              <a:t>function </a:t>
+              <a:t>Secondly, if we look at the first term of the objective function </a:t>
             </a:r>
           </a:p>
           <a:p>
             <a:r>
-              <a:rPr lang="en-US" dirty="0" err="1" smtClean="0"/>
+              <a:rPr lang="en-US" dirty="0" err="1"/>
               <a:t>E</a:t>
             </a:r>
             <a:r>
-              <a:rPr lang="en-US" baseline="-25000" dirty="0" err="1" smtClean="0"/>
+              <a:rPr lang="en-US" baseline="-25000" dirty="0" err="1"/>
               <a:t>q</a:t>
             </a:r>
             <a:r>
@@ -14590,23 +14483,15 @@
             </a:r>
             <a:r>
               <a:rPr lang="en-US" baseline="-25000" dirty="0" err="1"/>
-              <a:t>z|</a:t>
+              <a:t>z|x</a:t>
             </a:r>
             <a:r>
-              <a:rPr lang="en-US" baseline="-25000" dirty="0" err="1" smtClean="0"/>
-              <a:t>x</a:t>
-            </a:r>
-            <a:r>
-              <a:rPr lang="en-US" baseline="-25000" dirty="0" smtClean="0"/>
+              <a:rPr lang="en-US" baseline="-25000" dirty="0"/>
               <a:t>)</a:t>
             </a:r>
             <a:r>
-              <a:rPr lang="en-US" dirty="0" smtClean="0"/>
-              <a:t>[</a:t>
-            </a:r>
-            <a:r>
               <a:rPr lang="en-US" dirty="0"/>
-              <a:t>log(p(</a:t>
+              <a:t>[log(p(</a:t>
             </a:r>
             <a:r>
               <a:rPr lang="en-US" dirty="0" err="1"/>
@@ -14614,47 +14499,15 @@
             </a:r>
             <a:r>
               <a:rPr lang="en-US" dirty="0"/>
-              <a:t>))</a:t>
-            </a:r>
-            <a:r>
-              <a:rPr lang="en-US" dirty="0" smtClean="0"/>
-              <a:t>], </a:t>
-            </a:r>
-            <a:r>
-              <a:rPr lang="en-US" dirty="0"/>
-              <a:t>we are trying to maximize the likelihood given </a:t>
-            </a:r>
-            <a:r>
-              <a:rPr lang="en-US" dirty="0" smtClean="0"/>
-              <a:t>z. </a:t>
-            </a:r>
-            <a:r>
-              <a:rPr lang="en-US" dirty="0"/>
-              <a:t>Hence, the objective function will penalize when the encoder </a:t>
-            </a:r>
-            <a:r>
-              <a:rPr lang="en-US" dirty="0" smtClean="0"/>
-              <a:t>q</a:t>
-            </a:r>
-            <a:r>
-              <a:rPr lang="en-US" dirty="0"/>
-              <a:t>(</a:t>
+              <a:t>))], we are trying to maximize the likelihood given z. Hence, the objective function will penalize when the encoder q(</a:t>
             </a:r>
             <a:r>
               <a:rPr lang="en-US" dirty="0" err="1"/>
               <a:t>z|x</a:t>
             </a:r>
             <a:r>
-              <a:rPr lang="en-US" dirty="0" smtClean="0"/>
-              <a:t>) </a:t>
-            </a:r>
-            <a:r>
               <a:rPr lang="en-US" dirty="0"/>
-              <a:t>generates latent samples that do not represent well the data</a:t>
-            </a:r>
-            <a:r>
-              <a:rPr lang="en-US" dirty="0" smtClean="0"/>
-              <a:t>.</a:t>
+              <a:t>) generates latent samples that do not represent well the data.</a:t>
             </a:r>
           </a:p>
           <a:p>
@@ -14667,13 +14520,8 @@
             </a:r>
             <a:r>
               <a:rPr lang="en-US" dirty="0"/>
-              <a:t> and al. proposed another lower bound based on importance sampling that allow the model to better explore the latent space and increase the model flexibility</a:t>
+              <a:t> and al. proposed another lower bound based on importance sampling that allow the model to better explore the latent space and increase the model flexibility.</a:t>
             </a:r>
-            <a:r>
-              <a:rPr lang="en-US" dirty="0" smtClean="0"/>
-              <a:t>.</a:t>
-            </a:r>
-            <a:endParaRPr lang="en-US" dirty="0"/>
           </a:p>
         </p:txBody>
       </p:sp>
@@ -14774,7 +14622,7 @@
           <p:cNvPr id="29" name="Image 28">
             <a:extLst>
               <a:ext uri="{FF2B5EF4-FFF2-40B4-BE49-F238E27FC236}">
-                <a16:creationId xmlns:a16="http://schemas.microsoft.com/office/drawing/2014/main" xmlns="" id="{B26E1080-A49C-4542-9B74-8F78F46911AF}"/>
+                <a16:creationId xmlns:a16="http://schemas.microsoft.com/office/drawing/2014/main" id="{B26E1080-A49C-4542-9B74-8F78F46911AF}"/>
               </a:ext>
             </a:extLst>
           </p:cNvPr>
@@ -14810,7 +14658,7 @@
           <p:cNvPr id="31" name="Image 30">
             <a:extLst>
               <a:ext uri="{FF2B5EF4-FFF2-40B4-BE49-F238E27FC236}">
-                <a16:creationId xmlns:a16="http://schemas.microsoft.com/office/drawing/2014/main" xmlns="" id="{3B15B3E1-CC10-46B9-905C-3CB6ADBE70D8}"/>
+                <a16:creationId xmlns:a16="http://schemas.microsoft.com/office/drawing/2014/main" id="{3B15B3E1-CC10-46B9-905C-3CB6ADBE70D8}"/>
               </a:ext>
             </a:extLst>
           </p:cNvPr>
@@ -14846,7 +14694,7 @@
           <p:cNvPr id="40" name="Image 39">
             <a:extLst>
               <a:ext uri="{FF2B5EF4-FFF2-40B4-BE49-F238E27FC236}">
-                <a16:creationId xmlns:a16="http://schemas.microsoft.com/office/drawing/2014/main" xmlns="" id="{166F3255-3372-40F4-A2BE-4C2CD58F82B2}"/>
+                <a16:creationId xmlns:a16="http://schemas.microsoft.com/office/drawing/2014/main" id="{166F3255-3372-40F4-A2BE-4C2CD58F82B2}"/>
               </a:ext>
             </a:extLst>
           </p:cNvPr>
@@ -14881,7 +14729,7 @@
           <p:cNvPr id="43" name="Image 42">
             <a:extLst>
               <a:ext uri="{FF2B5EF4-FFF2-40B4-BE49-F238E27FC236}">
-                <a16:creationId xmlns:a16="http://schemas.microsoft.com/office/drawing/2014/main" xmlns="" id="{8F255F1F-FEC3-491E-9F7F-30CCCCB41D4B}"/>
+                <a16:creationId xmlns:a16="http://schemas.microsoft.com/office/drawing/2014/main" id="{8F255F1F-FEC3-491E-9F7F-30CCCCB41D4B}"/>
               </a:ext>
             </a:extLst>
           </p:cNvPr>
@@ -14916,7 +14764,7 @@
           <p:cNvPr id="44" name="Text Placeholder 14">
             <a:extLst>
               <a:ext uri="{FF2B5EF4-FFF2-40B4-BE49-F238E27FC236}">
-                <a16:creationId xmlns:a16="http://schemas.microsoft.com/office/drawing/2014/main" xmlns="" id="{7BCD762B-0436-4477-B02C-A380D58DEF71}"/>
+                <a16:creationId xmlns:a16="http://schemas.microsoft.com/office/drawing/2014/main" id="{7BCD762B-0436-4477-B02C-A380D58DEF71}"/>
               </a:ext>
             </a:extLst>
           </p:cNvPr>
@@ -15094,42 +14942,12 @@
           </a:p>
         </p:txBody>
       </p:sp>
-      <p:pic>
-        <p:nvPicPr>
-          <p:cNvPr id="46" name="Image 45">
-            <a:extLst>
-              <a:ext uri="{FF2B5EF4-FFF2-40B4-BE49-F238E27FC236}">
-                <a16:creationId xmlns:a16="http://schemas.microsoft.com/office/drawing/2014/main" xmlns="" id="{105FEA30-3B5C-4A55-B9DD-E63B983D2825}"/>
-              </a:ext>
-            </a:extLst>
-          </p:cNvPr>
-          <p:cNvPicPr>
-            <a:picLocks noChangeAspect="1"/>
-          </p:cNvPicPr>
-          <p:nvPr/>
-        </p:nvPicPr>
-        <p:blipFill>
-          <a:blip r:embed="rId7"/>
-          <a:stretch>
-            <a:fillRect/>
-          </a:stretch>
-        </p:blipFill>
-        <p:spPr>
-          <a:xfrm>
-            <a:off x="34398171" y="8400029"/>
-            <a:ext cx="8257145" cy="1603212"/>
-          </a:xfrm>
-          <a:prstGeom prst="rect">
-            <a:avLst/>
-          </a:prstGeom>
-        </p:spPr>
-      </p:pic>
       <p:sp>
         <p:nvSpPr>
           <p:cNvPr id="47" name="Text Placeholder 3">
             <a:extLst>
               <a:ext uri="{FF2B5EF4-FFF2-40B4-BE49-F238E27FC236}">
-                <a16:creationId xmlns:a16="http://schemas.microsoft.com/office/drawing/2014/main" xmlns="" id="{CD3ABEB4-FBB2-46B7-BBB7-A9A1816BD860}"/>
+                <a16:creationId xmlns:a16="http://schemas.microsoft.com/office/drawing/2014/main" id="{CD3ABEB4-FBB2-46B7-BBB7-A9A1816BD860}"/>
               </a:ext>
             </a:extLst>
           </p:cNvPr>
@@ -15304,7 +15122,7 @@
           <p:cNvPr id="54" name="Image 53">
             <a:extLst>
               <a:ext uri="{FF2B5EF4-FFF2-40B4-BE49-F238E27FC236}">
-                <a16:creationId xmlns:a16="http://schemas.microsoft.com/office/drawing/2014/main" xmlns="" id="{1455D682-5816-44A7-9F7A-B6A1E65F977E}"/>
+                <a16:creationId xmlns:a16="http://schemas.microsoft.com/office/drawing/2014/main" id="{1455D682-5816-44A7-9F7A-B6A1E65F977E}"/>
               </a:ext>
             </a:extLst>
           </p:cNvPr>
@@ -15314,7 +15132,7 @@
           <p:nvPr/>
         </p:nvPicPr>
         <p:blipFill rotWithShape="1">
-          <a:blip r:embed="rId8"/>
+          <a:blip r:embed="rId7"/>
           <a:srcRect l="4181" t="2699" r="7868" b="67734"/>
           <a:stretch/>
         </p:blipFill>
@@ -15333,7 +15151,7 @@
           <p:cNvPr id="56" name="Text Placeholder 14">
             <a:extLst>
               <a:ext uri="{FF2B5EF4-FFF2-40B4-BE49-F238E27FC236}">
-                <a16:creationId xmlns:a16="http://schemas.microsoft.com/office/drawing/2014/main" xmlns="" id="{3584AABC-01A8-4A44-BECE-7C3C5F0501B6}"/>
+                <a16:creationId xmlns:a16="http://schemas.microsoft.com/office/drawing/2014/main" id="{3584AABC-01A8-4A44-BECE-7C3C5F0501B6}"/>
               </a:ext>
             </a:extLst>
           </p:cNvPr>
@@ -15512,7 +15330,7 @@
           <p:cNvPr id="5" name="Group 4">
             <a:extLst>
               <a:ext uri="{FF2B5EF4-FFF2-40B4-BE49-F238E27FC236}">
-                <a16:creationId xmlns:a16="http://schemas.microsoft.com/office/drawing/2014/main" xmlns="" id="{12358EBB-CCE4-41B8-A385-99FE038F7301}"/>
+                <a16:creationId xmlns:a16="http://schemas.microsoft.com/office/drawing/2014/main" id="{12358EBB-CCE4-41B8-A385-99FE038F7301}"/>
               </a:ext>
             </a:extLst>
           </p:cNvPr>
@@ -15532,7 +15350,7 @@
             <p:cNvPr id="48" name="Rectangle : coins arrondis 47">
               <a:extLst>
                 <a:ext uri="{FF2B5EF4-FFF2-40B4-BE49-F238E27FC236}">
-                  <a16:creationId xmlns:a16="http://schemas.microsoft.com/office/drawing/2014/main" xmlns="" id="{BCD00AC4-13F6-4D14-8352-6F59ECCA65CB}"/>
+                  <a16:creationId xmlns:a16="http://schemas.microsoft.com/office/drawing/2014/main" id="{BCD00AC4-13F6-4D14-8352-6F59ECCA65CB}"/>
                 </a:ext>
               </a:extLst>
             </p:cNvPr>
@@ -15578,7 +15396,7 @@
             <p:cNvPr id="51" name="Connecteur droit avec flèche 50">
               <a:extLst>
                 <a:ext uri="{FF2B5EF4-FFF2-40B4-BE49-F238E27FC236}">
-                  <a16:creationId xmlns:a16="http://schemas.microsoft.com/office/drawing/2014/main" xmlns="" id="{AEDC7BDB-89E0-417D-8045-C608AF37F29B}"/>
+                  <a16:creationId xmlns:a16="http://schemas.microsoft.com/office/drawing/2014/main" id="{AEDC7BDB-89E0-417D-8045-C608AF37F29B}"/>
                 </a:ext>
               </a:extLst>
             </p:cNvPr>
@@ -15622,7 +15440,7 @@
             <p:cNvPr id="52" name="Ellipse 51">
               <a:extLst>
                 <a:ext uri="{FF2B5EF4-FFF2-40B4-BE49-F238E27FC236}">
-                  <a16:creationId xmlns:a16="http://schemas.microsoft.com/office/drawing/2014/main" xmlns="" id="{3AAA39E3-11DE-4AA7-83F2-CE06F7D86AF5}"/>
+                  <a16:creationId xmlns:a16="http://schemas.microsoft.com/office/drawing/2014/main" id="{3AAA39E3-11DE-4AA7-83F2-CE06F7D86AF5}"/>
                 </a:ext>
               </a:extLst>
             </p:cNvPr>
@@ -15666,65 +15484,13 @@
             </a:p>
           </p:txBody>
         </p:sp>
-        <p:sp>
-          <p:nvSpPr>
-            <p:cNvPr id="91" name="Rectangle : coins arrondis 90">
-              <a:extLst>
-                <a:ext uri="{FF2B5EF4-FFF2-40B4-BE49-F238E27FC236}">
-                  <a16:creationId xmlns:a16="http://schemas.microsoft.com/office/drawing/2014/main" xmlns="" id="{9C9368F8-85C7-4500-9DA3-CF759E6BBB95}"/>
-                </a:ext>
-              </a:extLst>
-            </p:cNvPr>
-            <p:cNvSpPr/>
-            <p:nvPr/>
-          </p:nvSpPr>
-          <p:spPr>
-            <a:xfrm>
-              <a:off x="1219107" y="14220542"/>
-              <a:ext cx="499927" cy="465183"/>
-            </a:xfrm>
-            <a:prstGeom prst="roundRect">
-              <a:avLst>
-                <a:gd name="adj" fmla="val 0"/>
-              </a:avLst>
-            </a:prstGeom>
-          </p:spPr>
-          <p:style>
-            <a:lnRef idx="2">
-              <a:schemeClr val="accent1">
-                <a:shade val="50000"/>
-              </a:schemeClr>
-            </a:lnRef>
-            <a:fillRef idx="1">
-              <a:schemeClr val="accent1"/>
-            </a:fillRef>
-            <a:effectRef idx="0">
-              <a:schemeClr val="accent1"/>
-            </a:effectRef>
-            <a:fontRef idx="minor">
-              <a:schemeClr val="lt1"/>
-            </a:fontRef>
-          </p:style>
-          <p:txBody>
-            <a:bodyPr rtlCol="0" anchor="ctr"/>
-            <a:lstStyle/>
-            <a:p>
-              <a:pPr algn="ctr"/>
-              <a:r>
-                <a:rPr lang="en-US" sz="4800" dirty="0"/>
-                <a:t>Z</a:t>
-              </a:r>
-              <a:endParaRPr lang="fr-CA" sz="4800" dirty="0"/>
-            </a:p>
-          </p:txBody>
-        </p:sp>
       </p:grpSp>
       <p:grpSp>
         <p:nvGrpSpPr>
           <p:cNvPr id="19" name="Group 18">
             <a:extLst>
               <a:ext uri="{FF2B5EF4-FFF2-40B4-BE49-F238E27FC236}">
-                <a16:creationId xmlns:a16="http://schemas.microsoft.com/office/drawing/2014/main" xmlns="" id="{83220A97-CBAC-4CAD-AA3F-F3BD23AB5645}"/>
+                <a16:creationId xmlns:a16="http://schemas.microsoft.com/office/drawing/2014/main" id="{83220A97-CBAC-4CAD-AA3F-F3BD23AB5645}"/>
               </a:ext>
             </a:extLst>
           </p:cNvPr>
@@ -15744,7 +15510,7 @@
             <p:cNvPr id="57" name="Ellipse 56">
               <a:extLst>
                 <a:ext uri="{FF2B5EF4-FFF2-40B4-BE49-F238E27FC236}">
-                  <a16:creationId xmlns:a16="http://schemas.microsoft.com/office/drawing/2014/main" xmlns="" id="{7DBF2BE5-10A8-4FB1-BF67-C96FF78B734E}"/>
+                  <a16:creationId xmlns:a16="http://schemas.microsoft.com/office/drawing/2014/main" id="{7DBF2BE5-10A8-4FB1-BF67-C96FF78B734E}"/>
                 </a:ext>
               </a:extLst>
             </p:cNvPr>
@@ -15794,7 +15560,7 @@
             <p:cNvPr id="58" name="Flèche : haut 57">
               <a:extLst>
                 <a:ext uri="{FF2B5EF4-FFF2-40B4-BE49-F238E27FC236}">
-                  <a16:creationId xmlns:a16="http://schemas.microsoft.com/office/drawing/2014/main" xmlns="" id="{72AC517C-2B87-4080-B735-26C35549A60A}"/>
+                  <a16:creationId xmlns:a16="http://schemas.microsoft.com/office/drawing/2014/main" id="{72AC517C-2B87-4080-B735-26C35549A60A}"/>
                 </a:ext>
               </a:extLst>
             </p:cNvPr>
@@ -15844,7 +15610,7 @@
             <p:cNvPr id="59" name="Rectangle : coins arrondis 58">
               <a:extLst>
                 <a:ext uri="{FF2B5EF4-FFF2-40B4-BE49-F238E27FC236}">
-                  <a16:creationId xmlns:a16="http://schemas.microsoft.com/office/drawing/2014/main" xmlns="" id="{D8C16610-04F1-461C-81EF-A30FAA8BE432}"/>
+                  <a16:creationId xmlns:a16="http://schemas.microsoft.com/office/drawing/2014/main" id="{D8C16610-04F1-461C-81EF-A30FAA8BE432}"/>
                 </a:ext>
               </a:extLst>
             </p:cNvPr>
@@ -15893,7 +15659,7 @@
             <p:cNvPr id="60" name="Rectangle : coins arrondis 59">
               <a:extLst>
                 <a:ext uri="{FF2B5EF4-FFF2-40B4-BE49-F238E27FC236}">
-                  <a16:creationId xmlns:a16="http://schemas.microsoft.com/office/drawing/2014/main" xmlns="" id="{36D4F669-46E2-4A1D-B9F9-C3E5EE4FB105}"/>
+                  <a16:creationId xmlns:a16="http://schemas.microsoft.com/office/drawing/2014/main" id="{36D4F669-46E2-4A1D-B9F9-C3E5EE4FB105}"/>
                 </a:ext>
               </a:extLst>
             </p:cNvPr>
@@ -15943,7 +15709,7 @@
             <p:cNvPr id="63" name="Rectangle : coins arrondis 62">
               <a:extLst>
                 <a:ext uri="{FF2B5EF4-FFF2-40B4-BE49-F238E27FC236}">
-                  <a16:creationId xmlns:a16="http://schemas.microsoft.com/office/drawing/2014/main" xmlns="" id="{94B41CA6-645D-4445-BBF0-47D0C49AF2E8}"/>
+                  <a16:creationId xmlns:a16="http://schemas.microsoft.com/office/drawing/2014/main" id="{94B41CA6-645D-4445-BBF0-47D0C49AF2E8}"/>
                 </a:ext>
               </a:extLst>
             </p:cNvPr>
@@ -15993,7 +15759,7 @@
             <p:cNvPr id="67" name="Rectangle : coins arrondis 66">
               <a:extLst>
                 <a:ext uri="{FF2B5EF4-FFF2-40B4-BE49-F238E27FC236}">
-                  <a16:creationId xmlns:a16="http://schemas.microsoft.com/office/drawing/2014/main" xmlns="" id="{D94CB321-A9EA-4D1D-9F37-8E1C58BB3283}"/>
+                  <a16:creationId xmlns:a16="http://schemas.microsoft.com/office/drawing/2014/main" id="{D94CB321-A9EA-4D1D-9F37-8E1C58BB3283}"/>
                 </a:ext>
               </a:extLst>
             </p:cNvPr>
@@ -16045,7 +15811,7 @@
             <p:cNvPr id="72" name="Ellipse 71">
               <a:extLst>
                 <a:ext uri="{FF2B5EF4-FFF2-40B4-BE49-F238E27FC236}">
-                  <a16:creationId xmlns:a16="http://schemas.microsoft.com/office/drawing/2014/main" xmlns="" id="{88A73338-AE5D-4534-B676-E223E87EEA85}"/>
+                  <a16:creationId xmlns:a16="http://schemas.microsoft.com/office/drawing/2014/main" id="{88A73338-AE5D-4534-B676-E223E87EEA85}"/>
                 </a:ext>
               </a:extLst>
             </p:cNvPr>
@@ -16095,7 +15861,7 @@
             <p:cNvPr id="74" name="Connecteur droit avec flèche 73">
               <a:extLst>
                 <a:ext uri="{FF2B5EF4-FFF2-40B4-BE49-F238E27FC236}">
-                  <a16:creationId xmlns:a16="http://schemas.microsoft.com/office/drawing/2014/main" xmlns="" id="{FCCC5678-EA67-4CED-99EB-2DF05A6449B9}"/>
+                  <a16:creationId xmlns:a16="http://schemas.microsoft.com/office/drawing/2014/main" id="{FCCC5678-EA67-4CED-99EB-2DF05A6449B9}"/>
                 </a:ext>
               </a:extLst>
             </p:cNvPr>
@@ -16137,7 +15903,7 @@
             <p:cNvPr id="79" name="Connecteur droit avec flèche 78">
               <a:extLst>
                 <a:ext uri="{FF2B5EF4-FFF2-40B4-BE49-F238E27FC236}">
-                  <a16:creationId xmlns:a16="http://schemas.microsoft.com/office/drawing/2014/main" xmlns="" id="{36D5BA69-86C0-4452-AC71-E9731CCE3AD2}"/>
+                  <a16:creationId xmlns:a16="http://schemas.microsoft.com/office/drawing/2014/main" id="{36D5BA69-86C0-4452-AC71-E9731CCE3AD2}"/>
                 </a:ext>
               </a:extLst>
             </p:cNvPr>
@@ -16179,7 +15945,7 @@
             <p:cNvPr id="82" name="Connecteur droit avec flèche 81">
               <a:extLst>
                 <a:ext uri="{FF2B5EF4-FFF2-40B4-BE49-F238E27FC236}">
-                  <a16:creationId xmlns:a16="http://schemas.microsoft.com/office/drawing/2014/main" xmlns="" id="{80EEBF50-0FEF-42D2-816A-6655A3A977FE}"/>
+                  <a16:creationId xmlns:a16="http://schemas.microsoft.com/office/drawing/2014/main" id="{80EEBF50-0FEF-42D2-816A-6655A3A977FE}"/>
                 </a:ext>
               </a:extLst>
             </p:cNvPr>
@@ -16221,7 +15987,7 @@
             <p:cNvPr id="92" name="Accolade fermante 91">
               <a:extLst>
                 <a:ext uri="{FF2B5EF4-FFF2-40B4-BE49-F238E27FC236}">
-                  <a16:creationId xmlns:a16="http://schemas.microsoft.com/office/drawing/2014/main" xmlns="" id="{58D73F09-5760-42C4-952D-91B52DBBF486}"/>
+                  <a16:creationId xmlns:a16="http://schemas.microsoft.com/office/drawing/2014/main" id="{58D73F09-5760-42C4-952D-91B52DBBF486}"/>
                 </a:ext>
               </a:extLst>
             </p:cNvPr>
@@ -16266,7 +16032,7 @@
             <p:cNvPr id="95" name="Accolade fermante 94">
               <a:extLst>
                 <a:ext uri="{FF2B5EF4-FFF2-40B4-BE49-F238E27FC236}">
-                  <a16:creationId xmlns:a16="http://schemas.microsoft.com/office/drawing/2014/main" xmlns="" id="{DC084A30-A300-4B80-AA0F-AA79EB07B910}"/>
+                  <a16:creationId xmlns:a16="http://schemas.microsoft.com/office/drawing/2014/main" id="{DC084A30-A300-4B80-AA0F-AA79EB07B910}"/>
                 </a:ext>
               </a:extLst>
             </p:cNvPr>
@@ -16311,7 +16077,7 @@
             <p:cNvPr id="96" name="Rectangle 95">
               <a:extLst>
                 <a:ext uri="{FF2B5EF4-FFF2-40B4-BE49-F238E27FC236}">
-                  <a16:creationId xmlns:a16="http://schemas.microsoft.com/office/drawing/2014/main" xmlns="" id="{56C7E9A1-1206-4EBC-A672-6946530DB152}"/>
+                  <a16:creationId xmlns:a16="http://schemas.microsoft.com/office/drawing/2014/main" id="{56C7E9A1-1206-4EBC-A672-6946530DB152}"/>
                 </a:ext>
               </a:extLst>
             </p:cNvPr>
@@ -16359,7 +16125,7 @@
             <p:cNvPr id="97" name="Rectangle 96">
               <a:extLst>
                 <a:ext uri="{FF2B5EF4-FFF2-40B4-BE49-F238E27FC236}">
-                  <a16:creationId xmlns:a16="http://schemas.microsoft.com/office/drawing/2014/main" xmlns="" id="{50EF45D3-AF38-43C3-80A1-BD320E002583}"/>
+                  <a16:creationId xmlns:a16="http://schemas.microsoft.com/office/drawing/2014/main" id="{50EF45D3-AF38-43C3-80A1-BD320E002583}"/>
                 </a:ext>
               </a:extLst>
             </p:cNvPr>
@@ -16407,7 +16173,7 @@
             <p:cNvPr id="98" name="Flèche : haut 97">
               <a:extLst>
                 <a:ext uri="{FF2B5EF4-FFF2-40B4-BE49-F238E27FC236}">
-                  <a16:creationId xmlns:a16="http://schemas.microsoft.com/office/drawing/2014/main" xmlns="" id="{E2981F08-14A6-4333-BAD5-7701C356EA9B}"/>
+                  <a16:creationId xmlns:a16="http://schemas.microsoft.com/office/drawing/2014/main" id="{E2981F08-14A6-4333-BAD5-7701C356EA9B}"/>
                 </a:ext>
               </a:extLst>
             </p:cNvPr>
@@ -16458,7 +16224,7 @@
           <p:cNvPr id="61" name="Text Placeholder 1">
             <a:extLst>
               <a:ext uri="{FF2B5EF4-FFF2-40B4-BE49-F238E27FC236}">
-                <a16:creationId xmlns:a16="http://schemas.microsoft.com/office/drawing/2014/main" xmlns="" id="{A5A55B18-228E-4F31-8420-732F1F74A9F9}"/>
+                <a16:creationId xmlns:a16="http://schemas.microsoft.com/office/drawing/2014/main" id="{A5A55B18-228E-4F31-8420-732F1F74A9F9}"/>
               </a:ext>
             </a:extLst>
           </p:cNvPr>
@@ -16629,7 +16395,7 @@
           <p:cNvPr id="62" name="Text Placeholder 11">
             <a:extLst>
               <a:ext uri="{FF2B5EF4-FFF2-40B4-BE49-F238E27FC236}">
-                <a16:creationId xmlns:a16="http://schemas.microsoft.com/office/drawing/2014/main" xmlns="" id="{A43364F1-F3E1-4154-9BA3-93285BA3F1CA}"/>
+                <a16:creationId xmlns:a16="http://schemas.microsoft.com/office/drawing/2014/main" id="{A43364F1-F3E1-4154-9BA3-93285BA3F1CA}"/>
               </a:ext>
             </a:extLst>
           </p:cNvPr>
@@ -16861,7 +16627,7 @@
           <p:cNvPr id="20" name="Picture 19">
             <a:extLst>
               <a:ext uri="{FF2B5EF4-FFF2-40B4-BE49-F238E27FC236}">
-                <a16:creationId xmlns:a16="http://schemas.microsoft.com/office/drawing/2014/main" xmlns="" id="{52508552-17EF-4036-88EF-BDADCF729651}"/>
+                <a16:creationId xmlns:a16="http://schemas.microsoft.com/office/drawing/2014/main" id="{52508552-17EF-4036-88EF-BDADCF729651}"/>
               </a:ext>
             </a:extLst>
           </p:cNvPr>
@@ -16871,7 +16637,7 @@
           <p:nvPr/>
         </p:nvPicPr>
         <p:blipFill>
-          <a:blip r:embed="rId9"/>
+          <a:blip r:embed="rId8"/>
           <a:stretch>
             <a:fillRect/>
           </a:stretch>
@@ -16891,7 +16657,7 @@
           <p:cNvPr id="65" name="Text Placeholder 11">
             <a:extLst>
               <a:ext uri="{FF2B5EF4-FFF2-40B4-BE49-F238E27FC236}">
-                <a16:creationId xmlns:a16="http://schemas.microsoft.com/office/drawing/2014/main" xmlns="" id="{DF5C931B-8ABE-4D08-9D8E-9BF163424AF4}"/>
+                <a16:creationId xmlns:a16="http://schemas.microsoft.com/office/drawing/2014/main" id="{DF5C931B-8ABE-4D08-9D8E-9BF163424AF4}"/>
               </a:ext>
             </a:extLst>
           </p:cNvPr>
@@ -17097,7 +16863,7 @@
           <p:cNvPr id="66" name="Text Placeholder 11">
             <a:extLst>
               <a:ext uri="{FF2B5EF4-FFF2-40B4-BE49-F238E27FC236}">
-                <a16:creationId xmlns:a16="http://schemas.microsoft.com/office/drawing/2014/main" xmlns="" id="{9B9E7798-9D63-4283-8F3A-7CEFA3B9E130}"/>
+                <a16:creationId xmlns:a16="http://schemas.microsoft.com/office/drawing/2014/main" id="{9B9E7798-9D63-4283-8F3A-7CEFA3B9E130}"/>
               </a:ext>
             </a:extLst>
           </p:cNvPr>
@@ -17344,7 +17110,7 @@
           <p:cNvPr id="69" name="Text Placeholder 11">
             <a:extLst>
               <a:ext uri="{FF2B5EF4-FFF2-40B4-BE49-F238E27FC236}">
-                <a16:creationId xmlns:a16="http://schemas.microsoft.com/office/drawing/2014/main" xmlns="" id="{53032AE1-DBC6-43FB-99EF-D7444655C110}"/>
+                <a16:creationId xmlns:a16="http://schemas.microsoft.com/office/drawing/2014/main" id="{53032AE1-DBC6-43FB-99EF-D7444655C110}"/>
               </a:ext>
             </a:extLst>
           </p:cNvPr>
@@ -17587,7 +17353,7 @@
           <p:cNvPr id="41" name="Text Placeholder 14">
             <a:extLst>
               <a:ext uri="{FF2B5EF4-FFF2-40B4-BE49-F238E27FC236}">
-                <a16:creationId xmlns:a16="http://schemas.microsoft.com/office/drawing/2014/main" xmlns="" id="{3BB18B94-5F9C-4CAB-8CE9-6854910DEB8A}"/>
+                <a16:creationId xmlns:a16="http://schemas.microsoft.com/office/drawing/2014/main" id="{3BB18B94-5F9C-4CAB-8CE9-6854910DEB8A}"/>
               </a:ext>
             </a:extLst>
           </p:cNvPr>
@@ -17784,7 +17550,7 @@
             <p:cNvPr id="34" name="Image 33">
               <a:extLst>
                 <a:ext uri="{FF2B5EF4-FFF2-40B4-BE49-F238E27FC236}">
-                  <a16:creationId xmlns:a16="http://schemas.microsoft.com/office/drawing/2014/main" xmlns="" id="{A51EEDCE-810B-42EF-8386-D485415CC102}"/>
+                  <a16:creationId xmlns:a16="http://schemas.microsoft.com/office/drawing/2014/main" id="{A51EEDCE-810B-42EF-8386-D485415CC102}"/>
                 </a:ext>
               </a:extLst>
             </p:cNvPr>
@@ -17794,7 +17560,7 @@
             <p:nvPr/>
           </p:nvPicPr>
           <p:blipFill>
-            <a:blip r:embed="rId10">
+            <a:blip r:embed="rId9">
               <a:extLst>
                 <a:ext uri="{28A0092B-C50C-407E-A947-70E740481C1C}">
                   <a14:useLocalDpi xmlns:a14="http://schemas.microsoft.com/office/drawing/2010/main" val="0"/>
@@ -17820,7 +17586,7 @@
             <p:cNvPr id="32" name="Text Placeholder 6">
               <a:extLst>
                 <a:ext uri="{FF2B5EF4-FFF2-40B4-BE49-F238E27FC236}">
-                  <a16:creationId xmlns:a16="http://schemas.microsoft.com/office/drawing/2014/main" xmlns="" id="{679DF83E-27B2-489B-9C16-AC17B4A8A540}"/>
+                  <a16:creationId xmlns:a16="http://schemas.microsoft.com/office/drawing/2014/main" id="{679DF83E-27B2-489B-9C16-AC17B4A8A540}"/>
                 </a:ext>
               </a:extLst>
             </p:cNvPr>
@@ -18009,7 +17775,7 @@
             <p:cNvPr id="36" name="Image 35">
               <a:extLst>
                 <a:ext uri="{FF2B5EF4-FFF2-40B4-BE49-F238E27FC236}">
-                  <a16:creationId xmlns:a16="http://schemas.microsoft.com/office/drawing/2014/main" xmlns="" id="{C22A1C47-931A-453D-8ED5-FCEE83665E05}"/>
+                  <a16:creationId xmlns:a16="http://schemas.microsoft.com/office/drawing/2014/main" id="{C22A1C47-931A-453D-8ED5-FCEE83665E05}"/>
                 </a:ext>
               </a:extLst>
             </p:cNvPr>
@@ -18019,7 +17785,7 @@
             <p:nvPr/>
           </p:nvPicPr>
           <p:blipFill>
-            <a:blip r:embed="rId11">
+            <a:blip r:embed="rId10">
               <a:extLst>
                 <a:ext uri="{28A0092B-C50C-407E-A947-70E740481C1C}">
                   <a14:useLocalDpi xmlns:a14="http://schemas.microsoft.com/office/drawing/2010/main" val="0"/>
@@ -18045,7 +17811,7 @@
             <p:cNvPr id="37" name="Text Placeholder 6">
               <a:extLst>
                 <a:ext uri="{FF2B5EF4-FFF2-40B4-BE49-F238E27FC236}">
-                  <a16:creationId xmlns:a16="http://schemas.microsoft.com/office/drawing/2014/main" xmlns="" id="{1C1E200B-2FAE-4919-9CA4-F6FC1A105E1F}"/>
+                  <a16:creationId xmlns:a16="http://schemas.microsoft.com/office/drawing/2014/main" id="{1C1E200B-2FAE-4919-9CA4-F6FC1A105E1F}"/>
                 </a:ext>
               </a:extLst>
             </p:cNvPr>
@@ -18247,7 +18013,7 @@
           <p:cNvPr id="25" name="Text Placeholder 6">
             <a:extLst>
               <a:ext uri="{FF2B5EF4-FFF2-40B4-BE49-F238E27FC236}">
-                <a16:creationId xmlns:a16="http://schemas.microsoft.com/office/drawing/2014/main" xmlns="" id="{73370A92-B6C4-4FD7-9AD8-66D8BE4C9CC6}"/>
+                <a16:creationId xmlns:a16="http://schemas.microsoft.com/office/drawing/2014/main" id="{73370A92-B6C4-4FD7-9AD8-66D8BE4C9CC6}"/>
               </a:ext>
             </a:extLst>
           </p:cNvPr>
@@ -18421,7 +18187,7 @@
           <p:cNvPr id="70" name="Text Placeholder 7">
             <a:extLst>
               <a:ext uri="{FF2B5EF4-FFF2-40B4-BE49-F238E27FC236}">
-                <a16:creationId xmlns:a16="http://schemas.microsoft.com/office/drawing/2014/main" xmlns="" id="{99354331-A353-4121-8153-599186E92FF2}"/>
+                <a16:creationId xmlns:a16="http://schemas.microsoft.com/office/drawing/2014/main" id="{99354331-A353-4121-8153-599186E92FF2}"/>
               </a:ext>
             </a:extLst>
           </p:cNvPr>
@@ -18596,7 +18362,7 @@
           <p:cNvPr id="73" name="Text Placeholder 11">
             <a:extLst>
               <a:ext uri="{FF2B5EF4-FFF2-40B4-BE49-F238E27FC236}">
-                <a16:creationId xmlns:a16="http://schemas.microsoft.com/office/drawing/2014/main" xmlns="" id="{3D6E6B7E-31C6-4560-88A0-6837CA584291}"/>
+                <a16:creationId xmlns:a16="http://schemas.microsoft.com/office/drawing/2014/main" id="{3D6E6B7E-31C6-4560-88A0-6837CA584291}"/>
               </a:ext>
             </a:extLst>
           </p:cNvPr>
@@ -18862,7 +18628,7 @@
           <p:cNvPr id="22" name="Picture 21">
             <a:extLst>
               <a:ext uri="{FF2B5EF4-FFF2-40B4-BE49-F238E27FC236}">
-                <a16:creationId xmlns:a16="http://schemas.microsoft.com/office/drawing/2014/main" xmlns="" id="{06A2914F-2A33-4053-A566-4829EA21EF71}"/>
+                <a16:creationId xmlns:a16="http://schemas.microsoft.com/office/drawing/2014/main" id="{06A2914F-2A33-4053-A566-4829EA21EF71}"/>
               </a:ext>
             </a:extLst>
           </p:cNvPr>
@@ -18872,7 +18638,7 @@
           <p:nvPr/>
         </p:nvPicPr>
         <p:blipFill>
-          <a:blip r:embed="rId12"/>
+          <a:blip r:embed="rId11"/>
           <a:stretch>
             <a:fillRect/>
           </a:stretch>
@@ -18892,7 +18658,7 @@
           <p:cNvPr id="68" name="Text Placeholder 11">
             <a:extLst>
               <a:ext uri="{FF2B5EF4-FFF2-40B4-BE49-F238E27FC236}">
-                <a16:creationId xmlns:a16="http://schemas.microsoft.com/office/drawing/2014/main" xmlns="" id="{9B9E7798-9D63-4283-8F3A-7CEFA3B9E130}"/>
+                <a16:creationId xmlns:a16="http://schemas.microsoft.com/office/drawing/2014/main" id="{9B9E7798-9D63-4283-8F3A-7CEFA3B9E130}"/>
               </a:ext>
             </a:extLst>
           </p:cNvPr>
@@ -19061,16 +18827,12 @@
             </a:pPr>
             <a:r>
               <a:rPr lang="en-US" dirty="0"/>
-              <a:t>This gives us a lower bound with 3 important </a:t>
-            </a:r>
-            <a:r>
-              <a:rPr lang="en-US" dirty="0" smtClean="0"/>
-              <a:t>properties:</a:t>
+              <a:t>This gives us a lower bound with 3 important properties:</a:t>
             </a:r>
             <a:br>
-              <a:rPr lang="en-US" dirty="0" smtClean="0"/>
+              <a:rPr lang="en-US" dirty="0"/>
             </a:br>
-            <a:endParaRPr lang="en-US" dirty="0" smtClean="0"/>
+            <a:endParaRPr lang="en-US" dirty="0"/>
           </a:p>
           <a:p>
             <a:pPr marL="457200" indent="-457200">
@@ -19079,45 +18841,7 @@
             </a:pPr>
             <a:r>
               <a:rPr lang="en-US" dirty="0"/>
-              <a:t>w</a:t>
-            </a:r>
-            <a:r>
-              <a:rPr lang="en-US" dirty="0" smtClean="0"/>
-              <a:t>hen k </a:t>
-            </a:r>
-            <a:r>
-              <a:rPr lang="en-US" dirty="0"/>
-              <a:t>= </a:t>
-            </a:r>
-            <a:r>
-              <a:rPr lang="en-US" dirty="0" smtClean="0"/>
-              <a:t>1, </a:t>
-            </a:r>
-            <a:r>
-              <a:rPr lang="en-US" dirty="0"/>
-              <a:t>we recover the prior VAE objective function</a:t>
-            </a:r>
-            <a:r>
-              <a:rPr lang="en-US" dirty="0" smtClean="0"/>
-              <a:t>.</a:t>
-            </a:r>
-          </a:p>
-          <a:p>
-            <a:pPr marL="457200" indent="-457200">
-              <a:buFont typeface="+mj-lt"/>
-              <a:buAutoNum type="arabicPeriod"/>
-            </a:pPr>
-            <a:r>
-              <a:rPr lang="en-US" dirty="0" smtClean="0"/>
-              <a:t>as k </a:t>
-            </a:r>
-            <a:r>
-              <a:rPr lang="en-US" dirty="0"/>
-              <a:t>increases, we get a tighter </a:t>
-            </a:r>
-            <a:r>
-              <a:rPr lang="en-US" dirty="0" smtClean="0"/>
-              <a:t>bound</a:t>
+              <a:t>when k = 1, we recover the prior VAE objective function.</a:t>
             </a:r>
           </a:p>
           <a:p>
@@ -19127,32 +18851,100 @@
             </a:pPr>
             <a:r>
               <a:rPr lang="en-US" dirty="0"/>
-              <a:t>i</a:t>
+              <a:t>as k increases, we get a tighter bound</a:t>
             </a:r>
-            <a:r>
-              <a:rPr lang="en-US" dirty="0" smtClean="0"/>
-              <a:t>t is </a:t>
-            </a:r>
+          </a:p>
+          <a:p>
+            <a:pPr marL="457200" indent="-457200">
+              <a:buFont typeface="+mj-lt"/>
+              <a:buAutoNum type="arabicPeriod"/>
+            </a:pPr>
             <a:r>
               <a:rPr lang="en-US" dirty="0"/>
-              <a:t>a consistent estimator of </a:t>
+              <a:t>it is a consistent estimator of log(p(x))</a:t>
             </a:r>
-            <a:r>
-              <a:rPr lang="en-US" dirty="0" smtClean="0"/>
-              <a:t>log</a:t>
-            </a:r>
-            <a:r>
-              <a:rPr lang="en-US" dirty="0"/>
-              <a:t>(p(x)</a:t>
-            </a:r>
-            <a:r>
-              <a:rPr lang="en-US" dirty="0" smtClean="0"/>
-              <a:t>)</a:t>
-            </a:r>
-            <a:endParaRPr lang="en-US" dirty="0"/>
           </a:p>
         </p:txBody>
       </p:sp>
+      <p:sp>
+        <p:nvSpPr>
+          <p:cNvPr id="21" name="Oval 20">
+            <a:extLst>
+              <a:ext uri="{FF2B5EF4-FFF2-40B4-BE49-F238E27FC236}">
+                <a16:creationId xmlns:a16="http://schemas.microsoft.com/office/drawing/2014/main" id="{AA2720E7-F613-4A2F-BDD7-128D67EFB4E5}"/>
+              </a:ext>
+            </a:extLst>
+          </p:cNvPr>
+          <p:cNvSpPr/>
+          <p:nvPr/>
+        </p:nvSpPr>
+        <p:spPr>
+          <a:xfrm>
+            <a:off x="4789252" y="16030994"/>
+            <a:ext cx="666658" cy="633826"/>
+          </a:xfrm>
+          <a:prstGeom prst="ellipse">
+            <a:avLst/>
+          </a:prstGeom>
+        </p:spPr>
+        <p:style>
+          <a:lnRef idx="2">
+            <a:schemeClr val="accent1">
+              <a:shade val="50000"/>
+            </a:schemeClr>
+          </a:lnRef>
+          <a:fillRef idx="1">
+            <a:schemeClr val="accent1"/>
+          </a:fillRef>
+          <a:effectRef idx="0">
+            <a:schemeClr val="accent1"/>
+          </a:effectRef>
+          <a:fontRef idx="minor">
+            <a:schemeClr val="lt1"/>
+          </a:fontRef>
+        </p:style>
+        <p:txBody>
+          <a:bodyPr rtlCol="0" anchor="ctr"/>
+          <a:lstStyle/>
+          <a:p>
+            <a:pPr algn="ctr"/>
+            <a:r>
+              <a:rPr lang="en-US" sz="5400" dirty="0"/>
+              <a:t>Z</a:t>
+            </a:r>
+          </a:p>
+        </p:txBody>
+      </p:sp>
+      <p:pic>
+        <p:nvPicPr>
+          <p:cNvPr id="24" name="Picture 23">
+            <a:extLst>
+              <a:ext uri="{FF2B5EF4-FFF2-40B4-BE49-F238E27FC236}">
+                <a16:creationId xmlns:a16="http://schemas.microsoft.com/office/drawing/2014/main" id="{C01BEBA1-D9C4-49CC-B64E-832CC0A51DCA}"/>
+              </a:ext>
+            </a:extLst>
+          </p:cNvPr>
+          <p:cNvPicPr>
+            <a:picLocks noChangeAspect="1"/>
+          </p:cNvPicPr>
+          <p:nvPr/>
+        </p:nvPicPr>
+        <p:blipFill>
+          <a:blip r:embed="rId12"/>
+          <a:stretch>
+            <a:fillRect/>
+          </a:stretch>
+        </p:blipFill>
+        <p:spPr>
+          <a:xfrm>
+            <a:off x="34602541" y="8394008"/>
+            <a:ext cx="7591425" cy="1924050"/>
+          </a:xfrm>
+          <a:prstGeom prst="rect">
+            <a:avLst/>
+          </a:prstGeom>
+        </p:spPr>
+      </p:pic>
     </p:spTree>
     <p:extLst>
       <p:ext uri="{BB962C8B-B14F-4D97-AF65-F5344CB8AC3E}">

</xml_diff>